<commit_message>
Generated Assignment Lecture Slides
</commit_message>
<xml_diff>
--- a/GAM320/01/20-21-GAM320-01a-Assignment-1.pptx
+++ b/GAM320/01/20-21-GAM320-01a-Assignment-1.pptx
@@ -5,28 +5,27 @@
     <p:sldMasterId id="2147483648" r:id="rId1"/>
   </p:sldMasterIdLst>
   <p:notesMasterIdLst>
-    <p:notesMasterId r:id="rId18"/>
+    <p:notesMasterId r:id="rId17"/>
   </p:notesMasterIdLst>
   <p:handoutMasterIdLst>
-    <p:handoutMasterId r:id="rId19"/>
+    <p:handoutMasterId r:id="rId18"/>
   </p:handoutMasterIdLst>
   <p:sldIdLst>
     <p:sldId id="257" r:id="rId2"/>
     <p:sldId id="427" r:id="rId3"/>
-    <p:sldId id="433" r:id="rId4"/>
-    <p:sldId id="434" r:id="rId5"/>
-    <p:sldId id="435" r:id="rId6"/>
-    <p:sldId id="436" r:id="rId7"/>
-    <p:sldId id="437" r:id="rId8"/>
-    <p:sldId id="438" r:id="rId9"/>
-    <p:sldId id="439" r:id="rId10"/>
-    <p:sldId id="440" r:id="rId11"/>
-    <p:sldId id="441" r:id="rId12"/>
-    <p:sldId id="442" r:id="rId13"/>
-    <p:sldId id="443" r:id="rId14"/>
-    <p:sldId id="429" r:id="rId15"/>
-    <p:sldId id="444" r:id="rId16"/>
-    <p:sldId id="430" r:id="rId17"/>
+    <p:sldId id="434" r:id="rId4"/>
+    <p:sldId id="435" r:id="rId5"/>
+    <p:sldId id="436" r:id="rId6"/>
+    <p:sldId id="437" r:id="rId7"/>
+    <p:sldId id="438" r:id="rId8"/>
+    <p:sldId id="439" r:id="rId9"/>
+    <p:sldId id="440" r:id="rId10"/>
+    <p:sldId id="441" r:id="rId11"/>
+    <p:sldId id="442" r:id="rId12"/>
+    <p:sldId id="443" r:id="rId13"/>
+    <p:sldId id="429" r:id="rId14"/>
+    <p:sldId id="444" r:id="rId15"/>
+    <p:sldId id="430" r:id="rId16"/>
   </p:sldIdLst>
   <p:sldSz cx="9144000" cy="6858000" type="screen4x3"/>
   <p:notesSz cx="7315200" cy="9601200"/>
@@ -241,7 +240,7 @@
             <a:fld id="{134C908B-E4CF-4B88-8994-49C91B4DAC10}" type="datetimeFigureOut">
               <a:rPr lang="en-US" smtClean="0"/>
               <a:pPr/>
-              <a:t>9/19/2020</a:t>
+              <a:t>9/20/2020</a:t>
             </a:fld>
             <a:endParaRPr lang="en-US"/>
           </a:p>
@@ -408,7 +407,7 @@
             <a:fld id="{FCD4ED34-E2A7-4A73-B53B-08CB721EE63F}" type="datetimeFigureOut">
               <a:rPr lang="en-US" smtClean="0"/>
               <a:pPr/>
-              <a:t>9/19/2020</a:t>
+              <a:t>9/20/2020</a:t>
             </a:fld>
             <a:endParaRPr lang="en-GB"/>
           </a:p>
@@ -834,7 +833,7 @@
     </p:spTree>
     <p:extLst>
       <p:ext uri="{BB962C8B-B14F-4D97-AF65-F5344CB8AC3E}">
-        <p14:creationId xmlns:p14="http://schemas.microsoft.com/office/powerpoint/2010/main" val="2747091167"/>
+        <p14:creationId xmlns:p14="http://schemas.microsoft.com/office/powerpoint/2010/main" val="3617179654"/>
       </p:ext>
     </p:extLst>
   </p:cSld>
@@ -919,7 +918,7 @@
     </p:spTree>
     <p:extLst>
       <p:ext uri="{BB962C8B-B14F-4D97-AF65-F5344CB8AC3E}">
-        <p14:creationId xmlns:p14="http://schemas.microsoft.com/office/powerpoint/2010/main" val="3617179654"/>
+        <p14:creationId xmlns:p14="http://schemas.microsoft.com/office/powerpoint/2010/main" val="1352787223"/>
       </p:ext>
     </p:extLst>
   </p:cSld>
@@ -1004,7 +1003,7 @@
     </p:spTree>
     <p:extLst>
       <p:ext uri="{BB962C8B-B14F-4D97-AF65-F5344CB8AC3E}">
-        <p14:creationId xmlns:p14="http://schemas.microsoft.com/office/powerpoint/2010/main" val="1352787223"/>
+        <p14:creationId xmlns:p14="http://schemas.microsoft.com/office/powerpoint/2010/main" val="38716520"/>
       </p:ext>
     </p:extLst>
   </p:cSld>
@@ -1080,92 +1079,7 @@
             <a:fld id="{C59D3C0C-B4B3-4CD4-8ABD-56A2DBF64D39}" type="slidenum">
               <a:rPr lang="en-GB" smtClean="0"/>
               <a:pPr/>
-              <a:t>13</a:t>
-            </a:fld>
-            <a:endParaRPr lang="en-GB"/>
-          </a:p>
-        </p:txBody>
-      </p:sp>
-    </p:spTree>
-    <p:extLst>
-      <p:ext uri="{BB962C8B-B14F-4D97-AF65-F5344CB8AC3E}">
-        <p14:creationId xmlns:p14="http://schemas.microsoft.com/office/powerpoint/2010/main" val="38716520"/>
-      </p:ext>
-    </p:extLst>
-  </p:cSld>
-  <p:clrMapOvr>
-    <a:masterClrMapping/>
-  </p:clrMapOvr>
-</p:notes>
-</file>
-
-<file path=ppt/notesSlides/notesSlide14.xml><?xml version="1.0" encoding="utf-8"?>
-<p:notes xmlns:a="http://schemas.openxmlformats.org/drawingml/2006/main" xmlns:r="http://schemas.openxmlformats.org/officeDocument/2006/relationships" xmlns:p="http://schemas.openxmlformats.org/presentationml/2006/main">
-  <p:cSld>
-    <p:spTree>
-      <p:nvGrpSpPr>
-        <p:cNvPr id="1" name=""/>
-        <p:cNvGrpSpPr/>
-        <p:nvPr/>
-      </p:nvGrpSpPr>
-      <p:grpSpPr>
-        <a:xfrm>
-          <a:off x="0" y="0"/>
-          <a:ext cx="0" cy="0"/>
-          <a:chOff x="0" y="0"/>
-          <a:chExt cx="0" cy="0"/>
-        </a:xfrm>
-      </p:grpSpPr>
-      <p:sp>
-        <p:nvSpPr>
-          <p:cNvPr id="2" name="Slide Image Placeholder 1"/>
-          <p:cNvSpPr>
-            <a:spLocks noGrp="1" noRot="1" noChangeAspect="1"/>
-          </p:cNvSpPr>
-          <p:nvPr>
-            <p:ph type="sldImg"/>
-          </p:nvPr>
-        </p:nvSpPr>
-        <p:spPr/>
-      </p:sp>
-      <p:sp>
-        <p:nvSpPr>
-          <p:cNvPr id="3" name="Notes Placeholder 2"/>
-          <p:cNvSpPr>
-            <a:spLocks noGrp="1"/>
-          </p:cNvSpPr>
-          <p:nvPr>
-            <p:ph type="body" idx="1"/>
-          </p:nvPr>
-        </p:nvSpPr>
-        <p:spPr/>
-        <p:txBody>
-          <a:bodyPr/>
-          <a:lstStyle/>
-          <a:p>
-            <a:endParaRPr lang="en-GB"/>
-          </a:p>
-        </p:txBody>
-      </p:sp>
-      <p:sp>
-        <p:nvSpPr>
-          <p:cNvPr id="4" name="Slide Number Placeholder 3"/>
-          <p:cNvSpPr>
-            <a:spLocks noGrp="1"/>
-          </p:cNvSpPr>
-          <p:nvPr>
-            <p:ph type="sldNum" sz="quarter" idx="5"/>
-          </p:nvPr>
-        </p:nvSpPr>
-        <p:spPr/>
-        <p:txBody>
-          <a:bodyPr/>
-          <a:lstStyle/>
-          <a:p>
-            <a:fld id="{C59D3C0C-B4B3-4CD4-8ABD-56A2DBF64D39}" type="slidenum">
-              <a:rPr lang="en-GB" smtClean="0"/>
-              <a:pPr/>
-              <a:t>15</a:t>
+              <a:t>14</a:t>
             </a:fld>
             <a:endParaRPr lang="en-GB"/>
           </a:p>
@@ -1344,7 +1258,7 @@
     </p:spTree>
     <p:extLst>
       <p:ext uri="{BB962C8B-B14F-4D97-AF65-F5344CB8AC3E}">
-        <p14:creationId xmlns:p14="http://schemas.microsoft.com/office/powerpoint/2010/main" val="643699224"/>
+        <p14:creationId xmlns:p14="http://schemas.microsoft.com/office/powerpoint/2010/main" val="1167449147"/>
       </p:ext>
     </p:extLst>
   </p:cSld>
@@ -1429,7 +1343,7 @@
     </p:spTree>
     <p:extLst>
       <p:ext uri="{BB962C8B-B14F-4D97-AF65-F5344CB8AC3E}">
-        <p14:creationId xmlns:p14="http://schemas.microsoft.com/office/powerpoint/2010/main" val="1167449147"/>
+        <p14:creationId xmlns:p14="http://schemas.microsoft.com/office/powerpoint/2010/main" val="3489504394"/>
       </p:ext>
     </p:extLst>
   </p:cSld>
@@ -1514,7 +1428,7 @@
     </p:spTree>
     <p:extLst>
       <p:ext uri="{BB962C8B-B14F-4D97-AF65-F5344CB8AC3E}">
-        <p14:creationId xmlns:p14="http://schemas.microsoft.com/office/powerpoint/2010/main" val="3489504394"/>
+        <p14:creationId xmlns:p14="http://schemas.microsoft.com/office/powerpoint/2010/main" val="582910554"/>
       </p:ext>
     </p:extLst>
   </p:cSld>
@@ -1599,7 +1513,7 @@
     </p:spTree>
     <p:extLst>
       <p:ext uri="{BB962C8B-B14F-4D97-AF65-F5344CB8AC3E}">
-        <p14:creationId xmlns:p14="http://schemas.microsoft.com/office/powerpoint/2010/main" val="582910554"/>
+        <p14:creationId xmlns:p14="http://schemas.microsoft.com/office/powerpoint/2010/main" val="2600666684"/>
       </p:ext>
     </p:extLst>
   </p:cSld>
@@ -1684,7 +1598,7 @@
     </p:spTree>
     <p:extLst>
       <p:ext uri="{BB962C8B-B14F-4D97-AF65-F5344CB8AC3E}">
-        <p14:creationId xmlns:p14="http://schemas.microsoft.com/office/powerpoint/2010/main" val="2600666684"/>
+        <p14:creationId xmlns:p14="http://schemas.microsoft.com/office/powerpoint/2010/main" val="384983998"/>
       </p:ext>
     </p:extLst>
   </p:cSld>
@@ -1769,7 +1683,7 @@
     </p:spTree>
     <p:extLst>
       <p:ext uri="{BB962C8B-B14F-4D97-AF65-F5344CB8AC3E}">
-        <p14:creationId xmlns:p14="http://schemas.microsoft.com/office/powerpoint/2010/main" val="384983998"/>
+        <p14:creationId xmlns:p14="http://schemas.microsoft.com/office/powerpoint/2010/main" val="1824868276"/>
       </p:ext>
     </p:extLst>
   </p:cSld>
@@ -1854,7 +1768,7 @@
     </p:spTree>
     <p:extLst>
       <p:ext uri="{BB962C8B-B14F-4D97-AF65-F5344CB8AC3E}">
-        <p14:creationId xmlns:p14="http://schemas.microsoft.com/office/powerpoint/2010/main" val="1824868276"/>
+        <p14:creationId xmlns:p14="http://schemas.microsoft.com/office/powerpoint/2010/main" val="2747091167"/>
       </p:ext>
     </p:extLst>
   </p:cSld>
@@ -2061,7 +1975,7 @@
             <a:fld id="{24C0EDFE-3590-4448-BF7B-7FB41E82085F}" type="datetimeFigureOut">
               <a:rPr lang="en-US" smtClean="0"/>
               <a:pPr/>
-              <a:t>9/19/2020</a:t>
+              <a:t>9/20/2020</a:t>
             </a:fld>
             <a:endParaRPr lang="en-US" dirty="0"/>
           </a:p>
@@ -2292,7 +2206,7 @@
             <a:fld id="{24C0EDFE-3590-4448-BF7B-7FB41E82085F}" type="datetimeFigureOut">
               <a:rPr lang="en-US" smtClean="0"/>
               <a:pPr/>
-              <a:t>9/19/2020</a:t>
+              <a:t>9/20/2020</a:t>
             </a:fld>
             <a:endParaRPr lang="en-US" dirty="0"/>
           </a:p>
@@ -2658,7 +2572,7 @@
             <a:fld id="{24C0EDFE-3590-4448-BF7B-7FB41E82085F}" type="datetimeFigureOut">
               <a:rPr lang="en-US" smtClean="0"/>
               <a:pPr/>
-              <a:t>9/19/2020</a:t>
+              <a:t>9/20/2020</a:t>
             </a:fld>
             <a:endParaRPr lang="en-US" dirty="0"/>
           </a:p>
@@ -2972,7 +2886,7 @@
             <a:fld id="{24C0EDFE-3590-4448-BF7B-7FB41E82085F}" type="datetimeFigureOut">
               <a:rPr lang="en-US" smtClean="0"/>
               <a:pPr/>
-              <a:t>9/19/2020</a:t>
+              <a:t>9/20/2020</a:t>
             </a:fld>
             <a:endParaRPr lang="en-US" dirty="0"/>
           </a:p>
@@ -3102,7 +3016,7 @@
             <a:fld id="{24C0EDFE-3590-4448-BF7B-7FB41E82085F}" type="datetimeFigureOut">
               <a:rPr lang="en-US" smtClean="0"/>
               <a:pPr/>
-              <a:t>9/19/2020</a:t>
+              <a:t>9/20/2020</a:t>
             </a:fld>
             <a:endParaRPr lang="en-US" dirty="0"/>
           </a:p>
@@ -3194,7 +3108,7 @@
             <a:fld id="{24C0EDFE-3590-4448-BF7B-7FB41E82085F}" type="datetimeFigureOut">
               <a:rPr lang="en-US" smtClean="0"/>
               <a:pPr/>
-              <a:t>9/19/2020</a:t>
+              <a:t>9/20/2020</a:t>
             </a:fld>
             <a:endParaRPr lang="en-US" dirty="0"/>
           </a:p>
@@ -3473,7 +3387,7 @@
             <a:fld id="{24C0EDFE-3590-4448-BF7B-7FB41E82085F}" type="datetimeFigureOut">
               <a:rPr lang="en-US" smtClean="0"/>
               <a:pPr/>
-              <a:t>9/19/2020</a:t>
+              <a:t>9/20/2020</a:t>
             </a:fld>
             <a:endParaRPr lang="en-US" dirty="0"/>
           </a:p>
@@ -3725,7 +3639,7 @@
             <a:fld id="{24C0EDFE-3590-4448-BF7B-7FB41E82085F}" type="datetimeFigureOut">
               <a:rPr lang="en-US" smtClean="0"/>
               <a:pPr/>
-              <a:t>9/19/2020</a:t>
+              <a:t>9/20/2020</a:t>
             </a:fld>
             <a:endParaRPr lang="en-US" dirty="0"/>
           </a:p>
@@ -3902,7 +3816,7 @@
             <a:fld id="{24C0EDFE-3590-4448-BF7B-7FB41E82085F}" type="datetimeFigureOut">
               <a:rPr lang="en-US" smtClean="0"/>
               <a:pPr/>
-              <a:t>9/19/2020</a:t>
+              <a:t>9/20/2020</a:t>
             </a:fld>
             <a:endParaRPr lang="en-US" dirty="0"/>
           </a:p>
@@ -4657,7 +4571,7 @@
           <a:p>
             <a:r>
               <a:rPr lang="en-GB" dirty="0"/>
-              <a:t>Part D – Demo</a:t>
+              <a:t>Marking</a:t>
             </a:r>
           </a:p>
         </p:txBody>
@@ -4681,39 +4595,122 @@
         <p:spPr/>
         <p:txBody>
           <a:bodyPr>
-            <a:normAutofit/>
+            <a:normAutofit fontScale="92500" lnSpcReduction="20000"/>
           </a:bodyPr>
           <a:lstStyle/>
           <a:p>
             <a:r>
               <a:rPr lang="en-GB" dirty="0"/>
-              <a:t>You will demonstrate your prototype to all staff.</a:t>
-            </a:r>
-          </a:p>
-          <a:p>
+              <a:t>Marks are divided:</a:t>
+            </a:r>
+          </a:p>
+          <a:p>
+            <a:pPr lvl="1"/>
             <a:r>
               <a:rPr lang="en-GB" dirty="0"/>
-              <a:t>We will play your game and mark it against the </a:t>
+              <a:t>Individual (50%)</a:t>
+            </a:r>
+          </a:p>
+          <a:p>
+            <a:pPr lvl="2"/>
+            <a:r>
+              <a:rPr lang="en-GB" dirty="0"/>
+              <a:t>Team Working – </a:t>
             </a:r>
             <a:r>
               <a:rPr lang="en-GB" b="1" dirty="0"/>
-              <a:t>Product Evaluation</a:t>
-            </a:r>
+              <a:t>15%</a:t>
+            </a:r>
+          </a:p>
+          <a:p>
+            <a:pPr lvl="2"/>
             <a:r>
               <a:rPr lang="en-GB" dirty="0"/>
-              <a:t> rubric.</a:t>
-            </a:r>
-          </a:p>
-          <a:p>
+              <a:t>Agile – </a:t>
+            </a:r>
+            <a:r>
+              <a:rPr lang="en-GB" b="1" dirty="0"/>
+              <a:t>15%</a:t>
+            </a:r>
+          </a:p>
+          <a:p>
+            <a:pPr lvl="2"/>
             <a:r>
               <a:rPr lang="en-GB" dirty="0"/>
-              <a:t>We will then discuss and normalise your marks.</a:t>
-            </a:r>
-          </a:p>
-          <a:p>
+              <a:t>Version Control – </a:t>
+            </a:r>
             <a:r>
               <a:rPr lang="en-GB" b="1" dirty="0"/>
-              <a:t>Scheduled Week 13!</a:t>
+              <a:t>10%</a:t>
+            </a:r>
+          </a:p>
+          <a:p>
+            <a:pPr lvl="2"/>
+            <a:r>
+              <a:rPr lang="en-GB" dirty="0"/>
+              <a:t>Reflection (peer/self feedback) – </a:t>
+            </a:r>
+            <a:r>
+              <a:rPr lang="en-GB" b="1" dirty="0"/>
+              <a:t>10%</a:t>
+            </a:r>
+          </a:p>
+          <a:p>
+            <a:pPr lvl="1"/>
+            <a:r>
+              <a:rPr lang="en-GB" dirty="0"/>
+              <a:t>Game (50%)</a:t>
+            </a:r>
+          </a:p>
+          <a:p>
+            <a:pPr lvl="2"/>
+            <a:r>
+              <a:rPr lang="en-GB" dirty="0"/>
+              <a:t>Concept Coherence – </a:t>
+            </a:r>
+            <a:r>
+              <a:rPr lang="en-GB" b="1" dirty="0"/>
+              <a:t>15%</a:t>
+            </a:r>
+          </a:p>
+          <a:p>
+            <a:pPr lvl="2"/>
+            <a:r>
+              <a:rPr lang="en-GB" dirty="0"/>
+              <a:t>Creative Innovation – </a:t>
+            </a:r>
+            <a:r>
+              <a:rPr lang="en-GB" b="1" dirty="0"/>
+              <a:t>15%</a:t>
+            </a:r>
+          </a:p>
+          <a:p>
+            <a:pPr lvl="2"/>
+            <a:r>
+              <a:rPr lang="en-GB" dirty="0"/>
+              <a:t>Quality – </a:t>
+            </a:r>
+            <a:r>
+              <a:rPr lang="en-GB" b="1" dirty="0"/>
+              <a:t>10%</a:t>
+            </a:r>
+          </a:p>
+          <a:p>
+            <a:pPr lvl="2"/>
+            <a:r>
+              <a:rPr lang="en-GB" dirty="0"/>
+              <a:t>Player Engagement – </a:t>
+            </a:r>
+            <a:r>
+              <a:rPr lang="en-GB" b="1" dirty="0"/>
+              <a:t>10%</a:t>
+            </a:r>
+            <a:endParaRPr lang="en-GB" dirty="0"/>
+          </a:p>
+          <a:p>
+            <a:r>
+              <a:rPr lang="en-GB" b="1" dirty="0"/>
+              <a:t>Please read the rubric!</a:t>
             </a:r>
           </a:p>
           <a:p>
@@ -4732,7 +4729,7 @@
     </p:spTree>
     <p:extLst>
       <p:ext uri="{BB962C8B-B14F-4D97-AF65-F5344CB8AC3E}">
-        <p14:creationId xmlns:p14="http://schemas.microsoft.com/office/powerpoint/2010/main" val="2235729284"/>
+        <p14:creationId xmlns:p14="http://schemas.microsoft.com/office/powerpoint/2010/main" val="52082338"/>
       </p:ext>
     </p:extLst>
   </p:cSld>
@@ -4792,7 +4789,7 @@
           <a:p>
             <a:r>
               <a:rPr lang="en-GB" dirty="0"/>
-              <a:t>Marking</a:t>
+              <a:t>Marking – Version Control</a:t>
             </a:r>
           </a:p>
         </p:txBody>
@@ -4816,90 +4813,37 @@
         <p:spPr/>
         <p:txBody>
           <a:bodyPr>
-            <a:normAutofit fontScale="92500" lnSpcReduction="20000"/>
+            <a:normAutofit/>
           </a:bodyPr>
           <a:lstStyle/>
           <a:p>
             <a:r>
               <a:rPr lang="en-GB" dirty="0"/>
-              <a:t>Marks are divided:</a:t>
-            </a:r>
-          </a:p>
-          <a:p>
-            <a:pPr lvl="1"/>
+              <a:t>Every student is expect to engage with Version Control.</a:t>
+            </a:r>
+          </a:p>
+          <a:p>
             <a:r>
               <a:rPr lang="en-GB" dirty="0"/>
-              <a:t>Individual (50%)</a:t>
-            </a:r>
-          </a:p>
-          <a:p>
-            <a:pPr lvl="2"/>
+              <a:t>Staff will use the </a:t>
+            </a:r>
+            <a:r>
+              <a:rPr lang="en-GB" b="1" dirty="0"/>
+              <a:t>commit logs </a:t>
+            </a:r>
             <a:r>
               <a:rPr lang="en-GB" dirty="0"/>
-              <a:t>Team Working</a:t>
-            </a:r>
-          </a:p>
-          <a:p>
-            <a:pPr lvl="2"/>
+              <a:t>on Bitbucket to aid in marking version control.</a:t>
+            </a:r>
+          </a:p>
+          <a:p>
             <a:r>
               <a:rPr lang="en-GB" dirty="0"/>
-              <a:t>Agile</a:t>
-            </a:r>
-          </a:p>
-          <a:p>
-            <a:pPr lvl="2"/>
-            <a:r>
-              <a:rPr lang="en-GB" dirty="0"/>
-              <a:t>Version Control</a:t>
-            </a:r>
-          </a:p>
-          <a:p>
-            <a:pPr lvl="2"/>
-            <a:r>
-              <a:rPr lang="en-GB" dirty="0"/>
-              <a:t>Reflection (peer/self feedback)</a:t>
-            </a:r>
-          </a:p>
-          <a:p>
-            <a:pPr lvl="1"/>
-            <a:r>
-              <a:rPr lang="en-GB" dirty="0"/>
-              <a:t>Game (50%)</a:t>
-            </a:r>
-          </a:p>
-          <a:p>
-            <a:pPr lvl="2"/>
-            <a:r>
-              <a:rPr lang="en-GB" dirty="0"/>
-              <a:t>Concept Coherence</a:t>
-            </a:r>
-          </a:p>
-          <a:p>
-            <a:pPr lvl="2"/>
-            <a:r>
-              <a:rPr lang="en-GB" dirty="0"/>
-              <a:t>Creative Innovation</a:t>
-            </a:r>
-          </a:p>
-          <a:p>
-            <a:pPr lvl="2"/>
-            <a:r>
-              <a:rPr lang="en-GB" dirty="0"/>
-              <a:t>Quality</a:t>
-            </a:r>
-          </a:p>
-          <a:p>
-            <a:pPr lvl="2"/>
-            <a:r>
-              <a:rPr lang="en-GB" dirty="0"/>
-              <a:t>Player Engagement</a:t>
-            </a:r>
-          </a:p>
-          <a:p>
-            <a:r>
-              <a:rPr lang="en-GB" b="1" dirty="0"/>
-              <a:t>Please read the rubric!</a:t>
-            </a:r>
+              <a:t>We will also take into account how the different specialism engage with version control.</a:t>
+            </a:r>
+          </a:p>
+          <a:p>
+            <a:endParaRPr lang="en-GB" dirty="0"/>
           </a:p>
           <a:p>
             <a:pPr lvl="1"/>
@@ -4917,7 +4861,7 @@
     </p:spTree>
     <p:extLst>
       <p:ext uri="{BB962C8B-B14F-4D97-AF65-F5344CB8AC3E}">
-        <p14:creationId xmlns:p14="http://schemas.microsoft.com/office/powerpoint/2010/main" val="52082338"/>
+        <p14:creationId xmlns:p14="http://schemas.microsoft.com/office/powerpoint/2010/main" val="525322842"/>
       </p:ext>
     </p:extLst>
   </p:cSld>
@@ -4977,138 +4921,6 @@
           <a:p>
             <a:r>
               <a:rPr lang="en-GB" dirty="0"/>
-              <a:t>Marking – Version Control</a:t>
-            </a:r>
-          </a:p>
-        </p:txBody>
-      </p:sp>
-      <p:sp>
-        <p:nvSpPr>
-          <p:cNvPr id="3" name="Content Placeholder 2">
-            <a:extLst>
-              <a:ext uri="{FF2B5EF4-FFF2-40B4-BE49-F238E27FC236}">
-                <a16:creationId xmlns:a16="http://schemas.microsoft.com/office/drawing/2014/main" id="{ACFFD619-30C6-4E06-AA2D-409CA65FC6C2}"/>
-              </a:ext>
-            </a:extLst>
-          </p:cNvPr>
-          <p:cNvSpPr>
-            <a:spLocks noGrp="1"/>
-          </p:cNvSpPr>
-          <p:nvPr>
-            <p:ph idx="1"/>
-          </p:nvPr>
-        </p:nvSpPr>
-        <p:spPr/>
-        <p:txBody>
-          <a:bodyPr>
-            <a:normAutofit/>
-          </a:bodyPr>
-          <a:lstStyle/>
-          <a:p>
-            <a:r>
-              <a:rPr lang="en-GB" dirty="0"/>
-              <a:t>Every student is expect to engage with Version Control.</a:t>
-            </a:r>
-          </a:p>
-          <a:p>
-            <a:r>
-              <a:rPr lang="en-GB" dirty="0"/>
-              <a:t>Staff will use the </a:t>
-            </a:r>
-            <a:r>
-              <a:rPr lang="en-GB" b="1" dirty="0"/>
-              <a:t>commit logs </a:t>
-            </a:r>
-            <a:r>
-              <a:rPr lang="en-GB" dirty="0"/>
-              <a:t>on Bitbucket to aid in marking version control.</a:t>
-            </a:r>
-          </a:p>
-          <a:p>
-            <a:r>
-              <a:rPr lang="en-GB" dirty="0"/>
-              <a:t>We will also take into account how the different specialism engage with version control.</a:t>
-            </a:r>
-          </a:p>
-          <a:p>
-            <a:endParaRPr lang="en-GB" dirty="0"/>
-          </a:p>
-          <a:p>
-            <a:pPr lvl="1"/>
-            <a:endParaRPr lang="en-GB" dirty="0"/>
-          </a:p>
-          <a:p>
-            <a:endParaRPr lang="en-GB" b="1" dirty="0"/>
-          </a:p>
-          <a:p>
-            <a:pPr lvl="1"/>
-            <a:endParaRPr lang="en-GB" dirty="0"/>
-          </a:p>
-        </p:txBody>
-      </p:sp>
-    </p:spTree>
-    <p:extLst>
-      <p:ext uri="{BB962C8B-B14F-4D97-AF65-F5344CB8AC3E}">
-        <p14:creationId xmlns:p14="http://schemas.microsoft.com/office/powerpoint/2010/main" val="525322842"/>
-      </p:ext>
-    </p:extLst>
-  </p:cSld>
-  <p:clrMapOvr>
-    <a:masterClrMapping/>
-  </p:clrMapOvr>
-</p:sld>
-</file>
-
-<file path=ppt/slides/slide13.xml><?xml version="1.0" encoding="utf-8"?>
-<p:sld xmlns:a="http://schemas.openxmlformats.org/drawingml/2006/main" xmlns:r="http://schemas.openxmlformats.org/officeDocument/2006/relationships" xmlns:p="http://schemas.openxmlformats.org/presentationml/2006/main">
-  <p:cSld>
-    <p:spTree>
-      <p:nvGrpSpPr>
-        <p:cNvPr id="1" name=""/>
-        <p:cNvGrpSpPr/>
-        <p:nvPr/>
-      </p:nvGrpSpPr>
-      <p:grpSpPr>
-        <a:xfrm>
-          <a:off x="0" y="0"/>
-          <a:ext cx="0" cy="0"/>
-          <a:chOff x="0" y="0"/>
-          <a:chExt cx="0" cy="0"/>
-        </a:xfrm>
-      </p:grpSpPr>
-      <p:sp>
-        <p:nvSpPr>
-          <p:cNvPr id="2" name="Title 1">
-            <a:extLst>
-              <a:ext uri="{FF2B5EF4-FFF2-40B4-BE49-F238E27FC236}">
-                <a16:creationId xmlns:a16="http://schemas.microsoft.com/office/drawing/2014/main" id="{7EC754D0-CDD9-4AC6-BB91-40332CCE2471}"/>
-              </a:ext>
-            </a:extLst>
-          </p:cNvPr>
-          <p:cNvSpPr>
-            <a:spLocks noGrp="1"/>
-          </p:cNvSpPr>
-          <p:nvPr>
-            <p:ph type="title"/>
-          </p:nvPr>
-        </p:nvSpPr>
-        <p:spPr>
-          <a:xfrm>
-            <a:off x="445974" y="843707"/>
-            <a:ext cx="8229600" cy="634082"/>
-          </a:xfrm>
-          <a:prstGeom prst="rect">
-            <a:avLst/>
-          </a:prstGeom>
-        </p:spPr>
-        <p:txBody>
-          <a:bodyPr>
-            <a:normAutofit fontScale="90000"/>
-          </a:bodyPr>
-          <a:lstStyle/>
-          <a:p>
-            <a:r>
-              <a:rPr lang="en-GB" dirty="0"/>
               <a:t>Assignment Tips</a:t>
             </a:r>
           </a:p>
@@ -5186,7 +4998,7 @@
 </p:sld>
 </file>
 
-<file path=ppt/slides/slide14.xml><?xml version="1.0" encoding="utf-8"?>
+<file path=ppt/slides/slide13.xml><?xml version="1.0" encoding="utf-8"?>
 <p:sld xmlns:a="http://schemas.openxmlformats.org/drawingml/2006/main" xmlns:r="http://schemas.openxmlformats.org/officeDocument/2006/relationships" xmlns:p="http://schemas.openxmlformats.org/presentationml/2006/main">
   <p:cSld>
     <p:spTree>
@@ -6932,7 +6744,7 @@
 </p:sld>
 </file>
 
-<file path=ppt/slides/slide15.xml><?xml version="1.0" encoding="utf-8"?>
+<file path=ppt/slides/slide14.xml><?xml version="1.0" encoding="utf-8"?>
 <p:sld xmlns:a="http://schemas.openxmlformats.org/drawingml/2006/main" xmlns:r="http://schemas.openxmlformats.org/officeDocument/2006/relationships" xmlns:p="http://schemas.openxmlformats.org/presentationml/2006/main">
   <p:cSld>
     <p:spTree>
@@ -7082,7 +6894,7 @@
 </p:sld>
 </file>
 
-<file path=ppt/slides/slide16.xml><?xml version="1.0" encoding="utf-8"?>
+<file path=ppt/slides/slide15.xml><?xml version="1.0" encoding="utf-8"?>
 <p:sld xmlns:a="http://schemas.openxmlformats.org/drawingml/2006/main" xmlns:r="http://schemas.openxmlformats.org/officeDocument/2006/relationships" xmlns:p="http://schemas.openxmlformats.org/presentationml/2006/main">
   <p:cSld>
     <p:spTree>
@@ -7262,7 +7074,7 @@
           <a:p>
             <a:r>
               <a:rPr lang="en-GB" dirty="0"/>
-              <a:t>Develop a prototype game as part of a team</a:t>
+              <a:t>Develop a prototype game as part of a team.</a:t>
             </a:r>
           </a:p>
           <a:p>
@@ -7300,7 +7112,12 @@
               <a:rPr lang="en-GB" dirty="0"/>
               <a:t>Process Learning Outcome</a:t>
             </a:r>
-            <a:endParaRPr lang="en-GB" b="1" dirty="0"/>
+          </a:p>
+          <a:p>
+            <a:r>
+              <a:rPr lang="en-GB" b="1" dirty="0"/>
+              <a:t>This is assignment is worth 70% of your grade for the module!</a:t>
+            </a:r>
           </a:p>
           <a:p>
             <a:pPr lvl="1"/>
@@ -7457,7 +7274,7 @@
     </p:spTree>
     <p:extLst>
       <p:ext uri="{BB962C8B-B14F-4D97-AF65-F5344CB8AC3E}">
-        <p14:creationId xmlns:p14="http://schemas.microsoft.com/office/powerpoint/2010/main" val="389161998"/>
+        <p14:creationId xmlns:p14="http://schemas.microsoft.com/office/powerpoint/2010/main" val="1610548791"/>
       </p:ext>
     </p:extLst>
   </p:cSld>
@@ -7510,12 +7327,14 @@
           </a:prstGeom>
         </p:spPr>
         <p:txBody>
-          <a:bodyPr/>
+          <a:bodyPr>
+            <a:normAutofit fontScale="90000"/>
+          </a:bodyPr>
           <a:lstStyle/>
           <a:p>
             <a:r>
               <a:rPr lang="en-GB" dirty="0"/>
-              <a:t>Assignment Breakdown</a:t>
+              <a:t>Part A – Supervisor Meetings</a:t>
             </a:r>
           </a:p>
         </p:txBody>
@@ -7544,52 +7363,35 @@
           <a:lstStyle/>
           <a:p>
             <a:r>
-              <a:rPr lang="en-GB" b="1" dirty="0"/>
-              <a:t>Part A</a:t>
-            </a:r>
-            <a:r>
               <a:rPr lang="en-GB" dirty="0"/>
-              <a:t> – Attend Supervisor meetings</a:t>
-            </a:r>
-          </a:p>
-          <a:p>
-            <a:r>
-              <a:rPr lang="en-GB" b="1" dirty="0"/>
-              <a:t>Part B</a:t>
-            </a:r>
+              <a:t>You must attend all Supervisor Meetings. If you miss a meeting, please contact your supervisor and let your Team know.</a:t>
+            </a:r>
+          </a:p>
+          <a:p>
             <a:r>
               <a:rPr lang="en-GB" dirty="0"/>
-              <a:t> – Develop a prototype game</a:t>
-            </a:r>
-          </a:p>
-          <a:p>
-            <a:r>
-              <a:rPr lang="en-GB" b="1" dirty="0"/>
-              <a:t>Part C </a:t>
-            </a:r>
+              <a:t>Two Types of Meetings:</a:t>
+            </a:r>
+          </a:p>
+          <a:p>
+            <a:pPr lvl="1"/>
             <a:r>
               <a:rPr lang="en-GB" dirty="0"/>
-              <a:t>–</a:t>
-            </a:r>
-            <a:r>
-              <a:rPr lang="en-GB" b="1" dirty="0"/>
-              <a:t> </a:t>
-            </a:r>
+              <a:t>Individual Review</a:t>
+            </a:r>
+          </a:p>
+          <a:p>
+            <a:pPr lvl="1"/>
             <a:r>
               <a:rPr lang="en-GB" dirty="0"/>
-              <a:t>Attend Green Light Process</a:t>
-            </a:r>
-          </a:p>
-          <a:p>
-            <a:r>
-              <a:rPr lang="en-GB" b="1" dirty="0"/>
-              <a:t>Part D </a:t>
-            </a:r>
+              <a:t>Project Review/Planning Session</a:t>
+            </a:r>
+          </a:p>
+          <a:p>
             <a:r>
               <a:rPr lang="en-GB" dirty="0"/>
-              <a:t>– Attend Demo Day</a:t>
-            </a:r>
-            <a:endParaRPr lang="en-GB" b="1" dirty="0"/>
+              <a:t>You will not be marked at these meetings for the first two weeks</a:t>
+            </a:r>
           </a:p>
           <a:p>
             <a:endParaRPr lang="en-GB" b="1" dirty="0"/>
@@ -7603,7 +7405,7 @@
     </p:spTree>
     <p:extLst>
       <p:ext uri="{BB962C8B-B14F-4D97-AF65-F5344CB8AC3E}">
-        <p14:creationId xmlns:p14="http://schemas.microsoft.com/office/powerpoint/2010/main" val="1610548791"/>
+        <p14:creationId xmlns:p14="http://schemas.microsoft.com/office/powerpoint/2010/main" val="13446536"/>
       </p:ext>
     </p:extLst>
   </p:cSld>
@@ -7693,33 +7495,51 @@
           <a:p>
             <a:r>
               <a:rPr lang="en-GB" dirty="0"/>
-              <a:t>You must attend all Supervisor Meetings. If you miss a meeting, please contact your supervisor and let your Team know.</a:t>
-            </a:r>
-          </a:p>
-          <a:p>
+              <a:t>Individual Review</a:t>
+            </a:r>
+          </a:p>
+          <a:p>
+            <a:pPr lvl="1"/>
             <a:r>
               <a:rPr lang="en-GB" dirty="0"/>
-              <a:t>Two Types of Meetings:</a:t>
+              <a:t>Fill out the peer and self evaluation before the meeting.</a:t>
             </a:r>
           </a:p>
           <a:p>
             <a:pPr lvl="1"/>
             <a:r>
               <a:rPr lang="en-GB" dirty="0"/>
-              <a:t>Individual Review</a:t>
+              <a:t>Supervisors will read this out and as a Team you will deal with any issues raised.</a:t>
             </a:r>
           </a:p>
           <a:p>
             <a:pPr lvl="1"/>
             <a:r>
               <a:rPr lang="en-GB" dirty="0"/>
-              <a:t>Project Review/Planning Session</a:t>
-            </a:r>
-          </a:p>
-          <a:p>
+              <a:t>For the peer evaluation, there will be a </a:t>
+            </a:r>
+            <a:r>
+              <a:rPr lang="en-GB" b="1" dirty="0"/>
+              <a:t>public</a:t>
+            </a:r>
             <a:r>
               <a:rPr lang="en-GB" dirty="0"/>
-              <a:t>You will not be marked at these meetings for the first two weeks</a:t>
+              <a:t> and a </a:t>
+            </a:r>
+            <a:r>
+              <a:rPr lang="en-GB" b="1" dirty="0"/>
+              <a:t>confidential</a:t>
+            </a:r>
+            <a:r>
+              <a:rPr lang="en-GB" dirty="0"/>
+              <a:t> feedback section.</a:t>
+            </a:r>
+          </a:p>
+          <a:p>
+            <a:pPr lvl="1"/>
+            <a:r>
+              <a:rPr lang="en-GB" dirty="0"/>
+              <a:t>These sessions will be used to assess your Individual contribution to the project.</a:t>
             </a:r>
           </a:p>
           <a:p>
@@ -7734,7 +7554,7 @@
     </p:spTree>
     <p:extLst>
       <p:ext uri="{BB962C8B-B14F-4D97-AF65-F5344CB8AC3E}">
-        <p14:creationId xmlns:p14="http://schemas.microsoft.com/office/powerpoint/2010/main" val="13446536"/>
+        <p14:creationId xmlns:p14="http://schemas.microsoft.com/office/powerpoint/2010/main" val="1312093815"/>
       </p:ext>
     </p:extLst>
   </p:cSld>
@@ -7824,52 +7644,40 @@
           <a:p>
             <a:r>
               <a:rPr lang="en-GB" dirty="0"/>
-              <a:t>Individual Review</a:t>
+              <a:t>Project Review/Planning Session</a:t>
             </a:r>
           </a:p>
           <a:p>
             <a:pPr lvl="1"/>
             <a:r>
               <a:rPr lang="en-GB" dirty="0"/>
-              <a:t>Fill out the peer and self evaluation before the meeting.</a:t>
+              <a:t>This will be led by you.</a:t>
             </a:r>
           </a:p>
           <a:p>
             <a:pPr lvl="1"/>
             <a:r>
               <a:rPr lang="en-GB" dirty="0"/>
-              <a:t>Supervisors will read this out and as a Team you will deal with any issues raised.</a:t>
+              <a:t>Please post a build to your supervisor 24 hours before the meeting.</a:t>
             </a:r>
           </a:p>
           <a:p>
             <a:pPr lvl="1"/>
             <a:r>
               <a:rPr lang="en-GB" dirty="0"/>
-              <a:t>For the peer evaluation, there will be a </a:t>
-            </a:r>
-            <a:r>
-              <a:rPr lang="en-GB" b="1" dirty="0"/>
-              <a:t>public</a:t>
-            </a:r>
+              <a:t>We prefer working builds, but WIPs can be showcased.</a:t>
+            </a:r>
+          </a:p>
+          <a:p>
+            <a:pPr lvl="1"/>
             <a:r>
               <a:rPr lang="en-GB" dirty="0"/>
-              <a:t> and a </a:t>
-            </a:r>
-            <a:r>
-              <a:rPr lang="en-GB" b="1" dirty="0"/>
-              <a:t>confidential</a:t>
-            </a:r>
-            <a:r>
-              <a:rPr lang="en-GB" dirty="0"/>
-              <a:t> feedback section.</a:t>
+              <a:t>We will also carry out a Sprint Review/Retrospective and agree a set of actions for the next Sprint.</a:t>
             </a:r>
           </a:p>
           <a:p>
             <a:pPr lvl="1"/>
-            <a:r>
-              <a:rPr lang="en-GB" dirty="0"/>
-              <a:t>These sessions will be used to assess your Individual contribution to the project.</a:t>
-            </a:r>
+            <a:endParaRPr lang="en-GB" dirty="0"/>
           </a:p>
           <a:p>
             <a:endParaRPr lang="en-GB" b="1" dirty="0"/>
@@ -7883,7 +7691,7 @@
     </p:spTree>
     <p:extLst>
       <p:ext uri="{BB962C8B-B14F-4D97-AF65-F5344CB8AC3E}">
-        <p14:creationId xmlns:p14="http://schemas.microsoft.com/office/powerpoint/2010/main" val="1312093815"/>
+        <p14:creationId xmlns:p14="http://schemas.microsoft.com/office/powerpoint/2010/main" val="2806729123"/>
       </p:ext>
     </p:extLst>
   </p:cSld>
@@ -7943,7 +7751,7 @@
           <a:p>
             <a:r>
               <a:rPr lang="en-GB" dirty="0"/>
-              <a:t>Part A – Supervisor Meetings</a:t>
+              <a:t>Part B – Develop Prototype</a:t>
             </a:r>
           </a:p>
         </p:txBody>
@@ -7973,35 +7781,7 @@
           <a:p>
             <a:r>
               <a:rPr lang="en-GB" dirty="0"/>
-              <a:t>Project Review/Planning Session</a:t>
-            </a:r>
-          </a:p>
-          <a:p>
-            <a:pPr lvl="1"/>
-            <a:r>
-              <a:rPr lang="en-GB" dirty="0"/>
-              <a:t>This will be led by you.</a:t>
-            </a:r>
-          </a:p>
-          <a:p>
-            <a:pPr lvl="1"/>
-            <a:r>
-              <a:rPr lang="en-GB" dirty="0"/>
-              <a:t>Please post a build to your supervisor 24 hours before the meeting.</a:t>
-            </a:r>
-          </a:p>
-          <a:p>
-            <a:pPr lvl="1"/>
-            <a:r>
-              <a:rPr lang="en-GB" dirty="0"/>
-              <a:t>We prefer working builds, but WIPs can be showcased.</a:t>
-            </a:r>
-          </a:p>
-          <a:p>
-            <a:pPr lvl="1"/>
-            <a:r>
-              <a:rPr lang="en-GB" dirty="0"/>
-              <a:t>We will also carry out a Sprint Review/Retrospective and agree a set of actions for the next Sprint.</a:t>
+              <a:t>Use Studio Practice (and agreed times with your team) to build the prototype for your game.</a:t>
             </a:r>
           </a:p>
           <a:p>
@@ -8020,7 +7800,7 @@
     </p:spTree>
     <p:extLst>
       <p:ext uri="{BB962C8B-B14F-4D97-AF65-F5344CB8AC3E}">
-        <p14:creationId xmlns:p14="http://schemas.microsoft.com/office/powerpoint/2010/main" val="2806729123"/>
+        <p14:creationId xmlns:p14="http://schemas.microsoft.com/office/powerpoint/2010/main" val="1056467499"/>
       </p:ext>
     </p:extLst>
   </p:cSld>
@@ -8080,7 +7860,7 @@
           <a:p>
             <a:r>
               <a:rPr lang="en-GB" dirty="0"/>
-              <a:t>Part B – Develop Prototype</a:t>
+              <a:t>Part C – Green Light Process</a:t>
             </a:r>
           </a:p>
         </p:txBody>
@@ -8104,13 +7884,52 @@
         <p:spPr/>
         <p:txBody>
           <a:bodyPr>
-            <a:normAutofit/>
+            <a:normAutofit lnSpcReduction="10000"/>
           </a:bodyPr>
           <a:lstStyle/>
           <a:p>
             <a:r>
               <a:rPr lang="en-GB" dirty="0"/>
-              <a:t>Use Studio Practice (and agreed times with your team) to build the prototype for your game.</a:t>
+              <a:t>This is where you will have to pitch your game to staff.</a:t>
+            </a:r>
+          </a:p>
+          <a:p>
+            <a:r>
+              <a:rPr lang="en-GB" dirty="0"/>
+              <a:t>The game can receive the following rating:</a:t>
+            </a:r>
+          </a:p>
+          <a:p>
+            <a:pPr lvl="1"/>
+            <a:r>
+              <a:rPr lang="en-GB" dirty="0"/>
+              <a:t>Green: No major issues</a:t>
+            </a:r>
+          </a:p>
+          <a:p>
+            <a:pPr lvl="1"/>
+            <a:r>
+              <a:rPr lang="en-GB" dirty="0"/>
+              <a:t>Amber: Some issues to address</a:t>
+            </a:r>
+          </a:p>
+          <a:p>
+            <a:pPr lvl="1"/>
+            <a:r>
+              <a:rPr lang="en-GB" dirty="0"/>
+              <a:t>Red: Game can’t go ahead</a:t>
+            </a:r>
+          </a:p>
+          <a:p>
+            <a:r>
+              <a:rPr lang="en-GB" dirty="0"/>
+              <a:t>In the case red, you can defend the game and turn the rating to an amber.</a:t>
+            </a:r>
+          </a:p>
+          <a:p>
+            <a:r>
+              <a:rPr lang="en-GB" b="1" dirty="0"/>
+              <a:t>Scheduled Week 6!</a:t>
             </a:r>
           </a:p>
           <a:p>
@@ -8129,7 +7948,7 @@
     </p:spTree>
     <p:extLst>
       <p:ext uri="{BB962C8B-B14F-4D97-AF65-F5344CB8AC3E}">
-        <p14:creationId xmlns:p14="http://schemas.microsoft.com/office/powerpoint/2010/main" val="1056467499"/>
+        <p14:creationId xmlns:p14="http://schemas.microsoft.com/office/powerpoint/2010/main" val="4019156768"/>
       </p:ext>
     </p:extLst>
   </p:cSld>
@@ -8189,7 +8008,7 @@
           <a:p>
             <a:r>
               <a:rPr lang="en-GB" dirty="0"/>
-              <a:t>Part C – Green Light Process</a:t>
+              <a:t>Part D – Demo</a:t>
             </a:r>
           </a:p>
         </p:txBody>
@@ -8213,52 +8032,39 @@
         <p:spPr/>
         <p:txBody>
           <a:bodyPr>
-            <a:normAutofit lnSpcReduction="10000"/>
+            <a:normAutofit/>
           </a:bodyPr>
           <a:lstStyle/>
           <a:p>
             <a:r>
               <a:rPr lang="en-GB" dirty="0"/>
-              <a:t>This is where you will have to pitch your game to staff.</a:t>
+              <a:t>You will demonstrate your prototype to all staff.</a:t>
             </a:r>
           </a:p>
           <a:p>
             <a:r>
               <a:rPr lang="en-GB" dirty="0"/>
-              <a:t>The game can receive the following rating:</a:t>
-            </a:r>
-          </a:p>
-          <a:p>
-            <a:pPr lvl="1"/>
+              <a:t>We will play your game and mark it against the </a:t>
+            </a:r>
+            <a:r>
+              <a:rPr lang="en-GB" b="1" dirty="0"/>
+              <a:t>Product Evaluation</a:t>
+            </a:r>
             <a:r>
               <a:rPr lang="en-GB" dirty="0"/>
-              <a:t>Green: No major issues</a:t>
-            </a:r>
-          </a:p>
-          <a:p>
-            <a:pPr lvl="1"/>
+              <a:t> rubric.</a:t>
+            </a:r>
+          </a:p>
+          <a:p>
             <a:r>
               <a:rPr lang="en-GB" dirty="0"/>
-              <a:t>Amber: Some issues to address</a:t>
-            </a:r>
-          </a:p>
-          <a:p>
-            <a:pPr lvl="1"/>
-            <a:r>
-              <a:rPr lang="en-GB" dirty="0"/>
-              <a:t>Red: Game can’t go ahead</a:t>
-            </a:r>
-          </a:p>
-          <a:p>
-            <a:r>
-              <a:rPr lang="en-GB" dirty="0"/>
-              <a:t>In the case red, you can defend the game and turn the rating to an amber.</a:t>
+              <a:t>We will then discuss and normalise your marks.</a:t>
             </a:r>
           </a:p>
           <a:p>
             <a:r>
               <a:rPr lang="en-GB" b="1" dirty="0"/>
-              <a:t>Scheduled Week 6!</a:t>
+              <a:t>Scheduled Week 13!</a:t>
             </a:r>
           </a:p>
           <a:p>
@@ -8277,7 +8083,7 @@
     </p:spTree>
     <p:extLst>
       <p:ext uri="{BB962C8B-B14F-4D97-AF65-F5344CB8AC3E}">
-        <p14:creationId xmlns:p14="http://schemas.microsoft.com/office/powerpoint/2010/main" val="4019156768"/>
+        <p14:creationId xmlns:p14="http://schemas.microsoft.com/office/powerpoint/2010/main" val="2235729284"/>
       </p:ext>
     </p:extLst>
   </p:cSld>

</xml_diff>